<commit_message>
Update What’s new in Entity Framework Core 2.pptx
</commit_message>
<xml_diff>
--- a/What’s new in Entity Framework Core 2.pptx
+++ b/What’s new in Entity Framework Core 2.pptx
@@ -165,123 +165,6 @@
 
 <file path=ppt/changesInfos/changesInfo1.xml><?xml version="1.0" encoding="utf-8"?>
 <pc:chgInfo xmlns:a="http://schemas.openxmlformats.org/drawingml/2006/main" xmlns:r="http://schemas.openxmlformats.org/officeDocument/2006/relationships" xmlns:ac="http://schemas.microsoft.com/office/drawing/2013/main/command" xmlns:pc="http://schemas.microsoft.com/office/powerpoint/2013/main/command">
-  <pc:docChgLst>
-    <pc:chgData name="Chris Woodruff" userId="2dbf025665e4d94d" providerId="LiveId" clId="{2A98A463-9C7C-43F6-9D93-F1BE90E7B3CF}"/>
-  </pc:docChgLst>
-  <pc:docChgLst>
-    <pc:chgData name="Chris Woodruff" userId="2dbf025665e4d94d" providerId="LiveId" clId="{EB5C419C-9D7A-424F-AA50-78BFF8F5624B}"/>
-    <pc:docChg chg="undo custSel addSld delSld modSld sldOrd">
-      <pc:chgData name="Chris Woodruff" userId="2dbf025665e4d94d" providerId="LiveId" clId="{EB5C419C-9D7A-424F-AA50-78BFF8F5624B}" dt="2018-10-07T18:49:11.095" v="208" actId="20577"/>
-      <pc:docMkLst>
-        <pc:docMk/>
-      </pc:docMkLst>
-      <pc:sldChg chg="add del">
-        <pc:chgData name="Chris Woodruff" userId="2dbf025665e4d94d" providerId="LiveId" clId="{EB5C419C-9D7A-424F-AA50-78BFF8F5624B}" dt="2018-10-07T18:38:09.733" v="4" actId="2696"/>
-        <pc:sldMkLst>
-          <pc:docMk/>
-          <pc:sldMk cId="1317897041" sldId="267"/>
-        </pc:sldMkLst>
-      </pc:sldChg>
-      <pc:sldChg chg="del">
-        <pc:chgData name="Chris Woodruff" userId="2dbf025665e4d94d" providerId="LiveId" clId="{EB5C419C-9D7A-424F-AA50-78BFF8F5624B}" dt="2018-10-07T18:40:02.648" v="81" actId="2696"/>
-        <pc:sldMkLst>
-          <pc:docMk/>
-          <pc:sldMk cId="3728622791" sldId="272"/>
-        </pc:sldMkLst>
-      </pc:sldChg>
-      <pc:sldChg chg="modSp">
-        <pc:chgData name="Chris Woodruff" userId="2dbf025665e4d94d" providerId="LiveId" clId="{EB5C419C-9D7A-424F-AA50-78BFF8F5624B}" dt="2018-10-07T18:41:39.237" v="115" actId="20577"/>
-        <pc:sldMkLst>
-          <pc:docMk/>
-          <pc:sldMk cId="342056269" sldId="275"/>
-        </pc:sldMkLst>
-        <pc:spChg chg="mod">
-          <ac:chgData name="Chris Woodruff" userId="2dbf025665e4d94d" providerId="LiveId" clId="{EB5C419C-9D7A-424F-AA50-78BFF8F5624B}" dt="2018-10-07T18:41:39.237" v="115" actId="20577"/>
-          <ac:spMkLst>
-            <pc:docMk/>
-            <pc:sldMk cId="342056269" sldId="275"/>
-            <ac:spMk id="21" creationId="{1FAB10AD-8E22-4551-8406-D9F6B0C8D31C}"/>
-          </ac:spMkLst>
-        </pc:spChg>
-      </pc:sldChg>
-      <pc:sldChg chg="add del">
-        <pc:chgData name="Chris Woodruff" userId="2dbf025665e4d94d" providerId="LiveId" clId="{EB5C419C-9D7A-424F-AA50-78BFF8F5624B}" dt="2018-10-07T18:38:13.883" v="5" actId="2696"/>
-        <pc:sldMkLst>
-          <pc:docMk/>
-          <pc:sldMk cId="98762289" sldId="281"/>
-        </pc:sldMkLst>
-      </pc:sldChg>
-      <pc:sldChg chg="modSp del">
-        <pc:chgData name="Chris Woodruff" userId="2dbf025665e4d94d" providerId="LiveId" clId="{EB5C419C-9D7A-424F-AA50-78BFF8F5624B}" dt="2018-10-07T18:40:04.098" v="82" actId="2696"/>
-        <pc:sldMkLst>
-          <pc:docMk/>
-          <pc:sldMk cId="460163012" sldId="286"/>
-        </pc:sldMkLst>
-        <pc:spChg chg="mod">
-          <ac:chgData name="Chris Woodruff" userId="2dbf025665e4d94d" providerId="LiveId" clId="{EB5C419C-9D7A-424F-AA50-78BFF8F5624B}" dt="2018-10-07T18:39:33.565" v="79" actId="14100"/>
-          <ac:spMkLst>
-            <pc:docMk/>
-            <pc:sldMk cId="460163012" sldId="286"/>
-            <ac:spMk id="4" creationId="{A1F4371F-DEDD-463B-90B4-4857E175C0B3}"/>
-          </ac:spMkLst>
-        </pc:spChg>
-        <pc:spChg chg="mod">
-          <ac:chgData name="Chris Woodruff" userId="2dbf025665e4d94d" providerId="LiveId" clId="{EB5C419C-9D7A-424F-AA50-78BFF8F5624B}" dt="2018-10-07T18:39:40.794" v="80" actId="14100"/>
-          <ac:spMkLst>
-            <pc:docMk/>
-            <pc:sldMk cId="460163012" sldId="286"/>
-            <ac:spMk id="5" creationId="{B26DDEF1-5C5C-49E3-A2DD-0CCDF06D397B}"/>
-          </ac:spMkLst>
-        </pc:spChg>
-      </pc:sldChg>
-      <pc:sldChg chg="modSp">
-        <pc:chgData name="Chris Woodruff" userId="2dbf025665e4d94d" providerId="LiveId" clId="{EB5C419C-9D7A-424F-AA50-78BFF8F5624B}" dt="2018-10-07T18:49:11.095" v="208" actId="20577"/>
-        <pc:sldMkLst>
-          <pc:docMk/>
-          <pc:sldMk cId="3595587038" sldId="287"/>
-        </pc:sldMkLst>
-        <pc:spChg chg="mod">
-          <ac:chgData name="Chris Woodruff" userId="2dbf025665e4d94d" providerId="LiveId" clId="{EB5C419C-9D7A-424F-AA50-78BFF8F5624B}" dt="2018-10-07T18:49:11.095" v="208" actId="20577"/>
-          <ac:spMkLst>
-            <pc:docMk/>
-            <pc:sldMk cId="3595587038" sldId="287"/>
-            <ac:spMk id="10" creationId="{81F95C49-F46E-4A7C-B5D9-4C13FC1604A3}"/>
-          </ac:spMkLst>
-        </pc:spChg>
-      </pc:sldChg>
-      <pc:sldChg chg="ord">
-        <pc:chgData name="Chris Woodruff" userId="2dbf025665e4d94d" providerId="LiveId" clId="{EB5C419C-9D7A-424F-AA50-78BFF8F5624B}" dt="2018-10-07T18:40:24.925" v="83"/>
-        <pc:sldMkLst>
-          <pc:docMk/>
-          <pc:sldMk cId="382619369" sldId="297"/>
-        </pc:sldMkLst>
-      </pc:sldChg>
-      <pc:sldChg chg="del">
-        <pc:chgData name="Chris Woodruff" userId="2dbf025665e4d94d" providerId="LiveId" clId="{EB5C419C-9D7A-424F-AA50-78BFF8F5624B}" dt="2018-10-07T18:41:56.801" v="116" actId="2696"/>
-        <pc:sldMkLst>
-          <pc:docMk/>
-          <pc:sldMk cId="4223863248" sldId="311"/>
-        </pc:sldMkLst>
-      </pc:sldChg>
-      <pc:sldChg chg="del">
-        <pc:chgData name="Chris Woodruff" userId="2dbf025665e4d94d" providerId="LiveId" clId="{EB5C419C-9D7A-424F-AA50-78BFF8F5624B}" dt="2018-10-07T18:41:58.374" v="117" actId="2696"/>
-        <pc:sldMkLst>
-          <pc:docMk/>
-          <pc:sldMk cId="3462295041" sldId="312"/>
-        </pc:sldMkLst>
-      </pc:sldChg>
-      <pc:sldChg chg="ord">
-        <pc:chgData name="Chris Woodruff" userId="2dbf025665e4d94d" providerId="LiveId" clId="{EB5C419C-9D7A-424F-AA50-78BFF8F5624B}" dt="2018-10-07T18:40:24.925" v="83"/>
-        <pc:sldMkLst>
-          <pc:docMk/>
-          <pc:sldMk cId="2987168172" sldId="313"/>
-        </pc:sldMkLst>
-      </pc:sldChg>
-    </pc:docChg>
-  </pc:docChgLst>
-  <pc:docChgLst>
-    <pc:chgData name="Chris Woodruff" userId="2dbf025665e4d94d" providerId="LiveId" clId="{9284FA2C-74A1-42E8-ACB2-08C7FA22F6C2}"/>
-  </pc:docChgLst>
   <pc:docChgLst>
     <pc:chgData name="Chris Woodruff" userId="2dbf025665e4d94d" providerId="LiveId" clId="{3DB9D9AB-5439-429E-9BE2-A6337B212CE1}"/>
     <pc:docChg chg="undo redo custSel addSld delSld modSld sldOrd">
@@ -1174,6 +1057,123 @@
       </pc:sldChg>
     </pc:docChg>
   </pc:docChgLst>
+  <pc:docChgLst>
+    <pc:chgData name="Chris Woodruff" userId="2dbf025665e4d94d" providerId="LiveId" clId="{2A98A463-9C7C-43F6-9D93-F1BE90E7B3CF}"/>
+  </pc:docChgLst>
+  <pc:docChgLst>
+    <pc:chgData name="Chris Woodruff" userId="2dbf025665e4d94d" providerId="LiveId" clId="{9284FA2C-74A1-42E8-ACB2-08C7FA22F6C2}"/>
+  </pc:docChgLst>
+  <pc:docChgLst>
+    <pc:chgData name="Chris Woodruff" userId="2dbf025665e4d94d" providerId="LiveId" clId="{EB5C419C-9D7A-424F-AA50-78BFF8F5624B}"/>
+    <pc:docChg chg="undo custSel addSld delSld modSld sldOrd">
+      <pc:chgData name="Chris Woodruff" userId="2dbf025665e4d94d" providerId="LiveId" clId="{EB5C419C-9D7A-424F-AA50-78BFF8F5624B}" dt="2018-10-07T18:49:11.095" v="208" actId="20577"/>
+      <pc:docMkLst>
+        <pc:docMk/>
+      </pc:docMkLst>
+      <pc:sldChg chg="add del">
+        <pc:chgData name="Chris Woodruff" userId="2dbf025665e4d94d" providerId="LiveId" clId="{EB5C419C-9D7A-424F-AA50-78BFF8F5624B}" dt="2018-10-07T18:38:09.733" v="4" actId="2696"/>
+        <pc:sldMkLst>
+          <pc:docMk/>
+          <pc:sldMk cId="1317897041" sldId="267"/>
+        </pc:sldMkLst>
+      </pc:sldChg>
+      <pc:sldChg chg="del">
+        <pc:chgData name="Chris Woodruff" userId="2dbf025665e4d94d" providerId="LiveId" clId="{EB5C419C-9D7A-424F-AA50-78BFF8F5624B}" dt="2018-10-07T18:40:02.648" v="81" actId="2696"/>
+        <pc:sldMkLst>
+          <pc:docMk/>
+          <pc:sldMk cId="3728622791" sldId="272"/>
+        </pc:sldMkLst>
+      </pc:sldChg>
+      <pc:sldChg chg="modSp">
+        <pc:chgData name="Chris Woodruff" userId="2dbf025665e4d94d" providerId="LiveId" clId="{EB5C419C-9D7A-424F-AA50-78BFF8F5624B}" dt="2018-10-07T18:41:39.237" v="115" actId="20577"/>
+        <pc:sldMkLst>
+          <pc:docMk/>
+          <pc:sldMk cId="342056269" sldId="275"/>
+        </pc:sldMkLst>
+        <pc:spChg chg="mod">
+          <ac:chgData name="Chris Woodruff" userId="2dbf025665e4d94d" providerId="LiveId" clId="{EB5C419C-9D7A-424F-AA50-78BFF8F5624B}" dt="2018-10-07T18:41:39.237" v="115" actId="20577"/>
+          <ac:spMkLst>
+            <pc:docMk/>
+            <pc:sldMk cId="342056269" sldId="275"/>
+            <ac:spMk id="21" creationId="{1FAB10AD-8E22-4551-8406-D9F6B0C8D31C}"/>
+          </ac:spMkLst>
+        </pc:spChg>
+      </pc:sldChg>
+      <pc:sldChg chg="add del">
+        <pc:chgData name="Chris Woodruff" userId="2dbf025665e4d94d" providerId="LiveId" clId="{EB5C419C-9D7A-424F-AA50-78BFF8F5624B}" dt="2018-10-07T18:38:13.883" v="5" actId="2696"/>
+        <pc:sldMkLst>
+          <pc:docMk/>
+          <pc:sldMk cId="98762289" sldId="281"/>
+        </pc:sldMkLst>
+      </pc:sldChg>
+      <pc:sldChg chg="modSp del">
+        <pc:chgData name="Chris Woodruff" userId="2dbf025665e4d94d" providerId="LiveId" clId="{EB5C419C-9D7A-424F-AA50-78BFF8F5624B}" dt="2018-10-07T18:40:04.098" v="82" actId="2696"/>
+        <pc:sldMkLst>
+          <pc:docMk/>
+          <pc:sldMk cId="460163012" sldId="286"/>
+        </pc:sldMkLst>
+        <pc:spChg chg="mod">
+          <ac:chgData name="Chris Woodruff" userId="2dbf025665e4d94d" providerId="LiveId" clId="{EB5C419C-9D7A-424F-AA50-78BFF8F5624B}" dt="2018-10-07T18:39:33.565" v="79" actId="14100"/>
+          <ac:spMkLst>
+            <pc:docMk/>
+            <pc:sldMk cId="460163012" sldId="286"/>
+            <ac:spMk id="4" creationId="{A1F4371F-DEDD-463B-90B4-4857E175C0B3}"/>
+          </ac:spMkLst>
+        </pc:spChg>
+        <pc:spChg chg="mod">
+          <ac:chgData name="Chris Woodruff" userId="2dbf025665e4d94d" providerId="LiveId" clId="{EB5C419C-9D7A-424F-AA50-78BFF8F5624B}" dt="2018-10-07T18:39:40.794" v="80" actId="14100"/>
+          <ac:spMkLst>
+            <pc:docMk/>
+            <pc:sldMk cId="460163012" sldId="286"/>
+            <ac:spMk id="5" creationId="{B26DDEF1-5C5C-49E3-A2DD-0CCDF06D397B}"/>
+          </ac:spMkLst>
+        </pc:spChg>
+      </pc:sldChg>
+      <pc:sldChg chg="modSp">
+        <pc:chgData name="Chris Woodruff" userId="2dbf025665e4d94d" providerId="LiveId" clId="{EB5C419C-9D7A-424F-AA50-78BFF8F5624B}" dt="2018-10-07T18:49:11.095" v="208" actId="20577"/>
+        <pc:sldMkLst>
+          <pc:docMk/>
+          <pc:sldMk cId="3595587038" sldId="287"/>
+        </pc:sldMkLst>
+        <pc:spChg chg="mod">
+          <ac:chgData name="Chris Woodruff" userId="2dbf025665e4d94d" providerId="LiveId" clId="{EB5C419C-9D7A-424F-AA50-78BFF8F5624B}" dt="2018-10-07T18:49:11.095" v="208" actId="20577"/>
+          <ac:spMkLst>
+            <pc:docMk/>
+            <pc:sldMk cId="3595587038" sldId="287"/>
+            <ac:spMk id="10" creationId="{81F95C49-F46E-4A7C-B5D9-4C13FC1604A3}"/>
+          </ac:spMkLst>
+        </pc:spChg>
+      </pc:sldChg>
+      <pc:sldChg chg="ord">
+        <pc:chgData name="Chris Woodruff" userId="2dbf025665e4d94d" providerId="LiveId" clId="{EB5C419C-9D7A-424F-AA50-78BFF8F5624B}" dt="2018-10-07T18:40:24.925" v="83"/>
+        <pc:sldMkLst>
+          <pc:docMk/>
+          <pc:sldMk cId="382619369" sldId="297"/>
+        </pc:sldMkLst>
+      </pc:sldChg>
+      <pc:sldChg chg="del">
+        <pc:chgData name="Chris Woodruff" userId="2dbf025665e4d94d" providerId="LiveId" clId="{EB5C419C-9D7A-424F-AA50-78BFF8F5624B}" dt="2018-10-07T18:41:56.801" v="116" actId="2696"/>
+        <pc:sldMkLst>
+          <pc:docMk/>
+          <pc:sldMk cId="4223863248" sldId="311"/>
+        </pc:sldMkLst>
+      </pc:sldChg>
+      <pc:sldChg chg="del">
+        <pc:chgData name="Chris Woodruff" userId="2dbf025665e4d94d" providerId="LiveId" clId="{EB5C419C-9D7A-424F-AA50-78BFF8F5624B}" dt="2018-10-07T18:41:58.374" v="117" actId="2696"/>
+        <pc:sldMkLst>
+          <pc:docMk/>
+          <pc:sldMk cId="3462295041" sldId="312"/>
+        </pc:sldMkLst>
+      </pc:sldChg>
+      <pc:sldChg chg="ord">
+        <pc:chgData name="Chris Woodruff" userId="2dbf025665e4d94d" providerId="LiveId" clId="{EB5C419C-9D7A-424F-AA50-78BFF8F5624B}" dt="2018-10-07T18:40:24.925" v="83"/>
+        <pc:sldMkLst>
+          <pc:docMk/>
+          <pc:sldMk cId="2987168172" sldId="313"/>
+        </pc:sldMkLst>
+      </pc:sldChg>
+    </pc:docChg>
+  </pc:docChgLst>
 </pc:chgInfo>
 </file>
 
@@ -1259,7 +1259,7 @@
           <a:p>
             <a:fld id="{21D56219-E84E-4D24-9852-DB0F76E72D55}" type="datetimeFigureOut">
               <a:rPr lang="en-US" smtClean="0"/>
-              <a:t>10/8/2018</a:t>
+              <a:t>10/9/2018</a:t>
             </a:fld>
             <a:endParaRPr lang="en-US"/>
           </a:p>
@@ -27041,8 +27041,8 @@
         </p:nvSpPr>
         <p:spPr>
           <a:xfrm>
-            <a:off x="527991" y="1224336"/>
-            <a:ext cx="7485570" cy="4524315"/>
+            <a:off x="527990" y="1224336"/>
+            <a:ext cx="7727735" cy="3785652"/>
           </a:xfrm>
           <a:prstGeom prst="rect">
             <a:avLst/>
@@ -27059,16 +27059,8 @@
               <a:buChar char="•"/>
             </a:pPr>
             <a:r>
-              <a:rPr lang="en-US" dirty="0"/>
-              <a:t>EF </a:t>
-            </a:r>
-            <a:r>
-              <a:rPr lang="en-US"/>
-              <a:t>Core 2.1 </a:t>
-            </a:r>
-            <a:r>
-              <a:rPr lang="en-US" dirty="0"/>
-              <a:t>won’t be binary compatible with EF Core 1.0</a:t>
+              <a:rPr lang="en-US" sz="2000" dirty="0"/>
+              <a:t>EF Core 2.1 won’t be binary compatible with EF Core 1.0</a:t>
             </a:r>
           </a:p>
           <a:p>
@@ -27076,7 +27068,7 @@
               <a:buFont typeface="Arial" panose="020B0604020202020204" pitchFamily="34" charset="0"/>
               <a:buChar char="•"/>
             </a:pPr>
-            <a:endParaRPr lang="en-US" dirty="0"/>
+            <a:endParaRPr lang="en-US" sz="2000" dirty="0"/>
           </a:p>
           <a:p>
             <a:pPr marL="285750" indent="-285750">
@@ -27084,8 +27076,8 @@
               <a:buChar char="•"/>
             </a:pPr>
             <a:r>
-              <a:rPr lang="en-US" dirty="0"/>
-              <a:t>The minimum version of .NET Framework supported is 4.6.1</a:t>
+              <a:rPr lang="en-US" sz="2000" dirty="0"/>
+              <a:t>Spatial Data Types high priority for EF Core 2.2</a:t>
             </a:r>
           </a:p>
           <a:p>
@@ -27093,7 +27085,7 @@
               <a:buFont typeface="Arial" panose="020B0604020202020204" pitchFamily="34" charset="0"/>
               <a:buChar char="•"/>
             </a:pPr>
-            <a:endParaRPr lang="en-US" dirty="0"/>
+            <a:endParaRPr lang="en-US" sz="2000" dirty="0"/>
           </a:p>
           <a:p>
             <a:pPr marL="285750" indent="-285750">
@@ -27101,16 +27093,8 @@
               <a:buChar char="•"/>
             </a:pPr>
             <a:r>
-              <a:rPr lang="en-US" dirty="0"/>
-              <a:t>The minimum version of </a:t>
-            </a:r>
-            <a:r>
-              <a:rPr lang="en-US" dirty="0" err="1"/>
-              <a:t>Xamarin.iOS</a:t>
-            </a:r>
-            <a:r>
-              <a:rPr lang="en-US" dirty="0"/>
-              <a:t> supported is 10.14</a:t>
+              <a:rPr lang="en-US" sz="2000" dirty="0"/>
+              <a:t>Support for collections of owned entities in EF Core 2.2</a:t>
             </a:r>
           </a:p>
           <a:p>
@@ -27118,7 +27102,7 @@
               <a:buFont typeface="Arial" panose="020B0604020202020204" pitchFamily="34" charset="0"/>
               <a:buChar char="•"/>
             </a:pPr>
-            <a:endParaRPr lang="en-US" dirty="0"/>
+            <a:endParaRPr lang="en-US" sz="2000" dirty="0"/>
           </a:p>
           <a:p>
             <a:pPr marL="285750" indent="-285750">
@@ -27126,16 +27110,8 @@
               <a:buChar char="•"/>
             </a:pPr>
             <a:r>
-              <a:rPr lang="en-US" dirty="0"/>
-              <a:t>The minimum version of </a:t>
-            </a:r>
-            <a:r>
-              <a:rPr lang="en-US" dirty="0" err="1"/>
-              <a:t>Xamarin.Android</a:t>
-            </a:r>
-            <a:r>
-              <a:rPr lang="en-US" dirty="0"/>
-              <a:t> supported is 8.0</a:t>
+              <a:rPr lang="en-US" sz="2000" dirty="0"/>
+              <a:t>Cosmos DB provider will be coming in EF Core 2.2</a:t>
             </a:r>
           </a:p>
           <a:p>
@@ -27143,7 +27119,7 @@
               <a:buFont typeface="Arial" panose="020B0604020202020204" pitchFamily="34" charset="0"/>
               <a:buChar char="•"/>
             </a:pPr>
-            <a:endParaRPr lang="en-US" dirty="0"/>
+            <a:endParaRPr lang="en-US" sz="2000" dirty="0"/>
           </a:p>
           <a:p>
             <a:pPr marL="285750" indent="-285750">
@@ -27151,54 +27127,24 @@
               <a:buChar char="•"/>
             </a:pPr>
             <a:r>
-              <a:rPr lang="en-US" dirty="0"/>
-              <a:t>The minimum version of UWP supported is 10.0.16299</a:t>
-            </a:r>
-          </a:p>
-          <a:p>
-            <a:endParaRPr lang="en-US" dirty="0"/>
+              <a:rPr lang="en-US" sz="2000" dirty="0"/>
+              <a:t>Working with Views may happen in EF Core 3.0</a:t>
+            </a:r>
           </a:p>
           <a:p>
             <a:pPr marL="285750" indent="-285750">
               <a:buFont typeface="Arial" panose="020B0604020202020204" pitchFamily="34" charset="0"/>
               <a:buChar char="•"/>
             </a:pPr>
-            <a:r>
-              <a:rPr lang="en-US" dirty="0"/>
-              <a:t>Spatial Data Types high priority for EF Core 2.2</a:t>
-            </a:r>
+            <a:endParaRPr lang="en-US" sz="2000" dirty="0"/>
           </a:p>
           <a:p>
             <a:pPr marL="285750" indent="-285750">
               <a:buFont typeface="Arial" panose="020B0604020202020204" pitchFamily="34" charset="0"/>
               <a:buChar char="•"/>
             </a:pPr>
-            <a:endParaRPr lang="en-US" dirty="0"/>
-          </a:p>
-          <a:p>
-            <a:pPr marL="285750" indent="-285750">
-              <a:buFont typeface="Arial" panose="020B0604020202020204" pitchFamily="34" charset="0"/>
-              <a:buChar char="•"/>
-            </a:pPr>
-            <a:r>
-              <a:rPr lang="en-US" dirty="0"/>
-              <a:t>Working with Views may happen in EF Core 3.0</a:t>
-            </a:r>
-          </a:p>
-          <a:p>
-            <a:pPr marL="285750" indent="-285750">
-              <a:buFont typeface="Arial" panose="020B0604020202020204" pitchFamily="34" charset="0"/>
-              <a:buChar char="•"/>
-            </a:pPr>
-            <a:endParaRPr lang="en-US" dirty="0"/>
-          </a:p>
-          <a:p>
-            <a:pPr marL="285750" indent="-285750">
-              <a:buFont typeface="Arial" panose="020B0604020202020204" pitchFamily="34" charset="0"/>
-              <a:buChar char="•"/>
-            </a:pPr>
-            <a:r>
-              <a:rPr lang="en-US" dirty="0"/>
+            <a:r>
+              <a:rPr lang="en-US" sz="2000" dirty="0"/>
               <a:t>Stored Procedures native support not support but work arounds using string interpolation in raw SQL methods</a:t>
             </a:r>
           </a:p>

</xml_diff>